<commit_message>
Updated Turning Lessons with Bug Note
</commit_message>
<xml_diff>
--- a/en/ProgrammingLessons/SP3AccurateTurning.pptx
+++ b/en/ProgrammingLessons/SP3AccurateTurning.pptx
@@ -5,21 +5,22 @@
     <p:sldMasterId id="2147483773" r:id="rId1"/>
   </p:sldMasterIdLst>
   <p:notesMasterIdLst>
-    <p:notesMasterId r:id="rId11"/>
+    <p:notesMasterId r:id="rId12"/>
   </p:notesMasterIdLst>
   <p:handoutMasterIdLst>
-    <p:handoutMasterId r:id="rId12"/>
+    <p:handoutMasterId r:id="rId13"/>
   </p:handoutMasterIdLst>
   <p:sldIdLst>
     <p:sldId id="275" r:id="rId2"/>
     <p:sldId id="257" r:id="rId3"/>
-    <p:sldId id="411" r:id="rId4"/>
-    <p:sldId id="412" r:id="rId5"/>
-    <p:sldId id="413" r:id="rId6"/>
-    <p:sldId id="416" r:id="rId7"/>
-    <p:sldId id="415" r:id="rId8"/>
-    <p:sldId id="414" r:id="rId9"/>
-    <p:sldId id="288" r:id="rId10"/>
+    <p:sldId id="417" r:id="rId4"/>
+    <p:sldId id="411" r:id="rId5"/>
+    <p:sldId id="412" r:id="rId6"/>
+    <p:sldId id="413" r:id="rId7"/>
+    <p:sldId id="416" r:id="rId8"/>
+    <p:sldId id="415" r:id="rId9"/>
+    <p:sldId id="414" r:id="rId10"/>
+    <p:sldId id="288" r:id="rId11"/>
   </p:sldIdLst>
   <p:sldSz cx="9144000" cy="6858000" type="screen4x3"/>
   <p:notesSz cx="6858000" cy="9144000"/>
@@ -219,7 +220,7 @@
           <a:p>
             <a:fld id="{58040048-1E4D-CD41-AC49-0750EB72586B}" type="datetimeFigureOut">
               <a:rPr lang="en-US" smtClean="0"/>
-              <a:t>5/12/23</a:t>
+              <a:t>5/12/2023</a:t>
             </a:fld>
             <a:endParaRPr lang="en-US"/>
           </a:p>
@@ -385,7 +386,7 @@
           <a:p>
             <a:fld id="{2B8484CF-5098-F24E-8881-583515D5C406}" type="datetimeFigureOut">
               <a:rPr lang="en-US" smtClean="0"/>
-              <a:t>5/12/23</a:t>
+              <a:t>5/12/2023</a:t>
             </a:fld>
             <a:endParaRPr lang="en-US"/>
           </a:p>
@@ -7561,6 +7562,530 @@
 </p:sld>
 </file>
 
+<file path=ppt/slides/slide10.xml><?xml version="1.0" encoding="utf-8"?>
+<p:sld xmlns:a="http://schemas.openxmlformats.org/drawingml/2006/main" xmlns:r="http://schemas.openxmlformats.org/officeDocument/2006/relationships" xmlns:p="http://schemas.openxmlformats.org/presentationml/2006/main">
+  <p:cSld>
+    <p:spTree>
+      <p:nvGrpSpPr>
+        <p:cNvPr id="1" name=""/>
+        <p:cNvGrpSpPr/>
+        <p:nvPr/>
+      </p:nvGrpSpPr>
+      <p:grpSpPr>
+        <a:xfrm>
+          <a:off x="0" y="0"/>
+          <a:ext cx="0" cy="0"/>
+          <a:chOff x="0" y="0"/>
+          <a:chExt cx="0" cy="0"/>
+        </a:xfrm>
+      </p:grpSpPr>
+      <p:sp>
+        <p:nvSpPr>
+          <p:cNvPr id="2" name="Title 1"/>
+          <p:cNvSpPr>
+            <a:spLocks noGrp="1"/>
+          </p:cNvSpPr>
+          <p:nvPr>
+            <p:ph type="title"/>
+          </p:nvPr>
+        </p:nvSpPr>
+        <p:spPr/>
+        <p:txBody>
+          <a:bodyPr/>
+          <a:lstStyle/>
+          <a:p>
+            <a:r>
+              <a:rPr lang="en-US" dirty="0"/>
+              <a:t>CREDITS</a:t>
+            </a:r>
+          </a:p>
+        </p:txBody>
+      </p:sp>
+      <p:sp>
+        <p:nvSpPr>
+          <p:cNvPr id="3" name="Content Placeholder 2"/>
+          <p:cNvSpPr>
+            <a:spLocks noGrp="1"/>
+          </p:cNvSpPr>
+          <p:nvPr>
+            <p:ph idx="1"/>
+          </p:nvPr>
+        </p:nvSpPr>
+        <p:spPr>
+          <a:xfrm>
+            <a:off x="457200" y="1317983"/>
+            <a:ext cx="8245474" cy="1145345"/>
+          </a:xfrm>
+        </p:spPr>
+        <p:txBody>
+          <a:bodyPr>
+            <a:normAutofit/>
+          </a:bodyPr>
+          <a:lstStyle/>
+          <a:p>
+            <a:r>
+              <a:rPr lang="en-US" sz="1600" dirty="0"/>
+              <a:t>This lesson was created by Sanjay Seshan and Arvind Seshan for SPIKE Prime Lessons</a:t>
+            </a:r>
+          </a:p>
+          <a:p>
+            <a:r>
+              <a:rPr lang="en-US" sz="1600" dirty="0"/>
+              <a:t>More lessons are available at www.primelessons.org</a:t>
+            </a:r>
+          </a:p>
+        </p:txBody>
+      </p:sp>
+      <p:sp>
+        <p:nvSpPr>
+          <p:cNvPr id="4" name="Footer Placeholder 3"/>
+          <p:cNvSpPr>
+            <a:spLocks noGrp="1"/>
+          </p:cNvSpPr>
+          <p:nvPr>
+            <p:ph type="ftr" sz="quarter" idx="11"/>
+          </p:nvPr>
+        </p:nvSpPr>
+        <p:spPr/>
+        <p:txBody>
+          <a:bodyPr/>
+          <a:lstStyle/>
+          <a:p>
+            <a:r>
+              <a:rPr lang="en-US"/>
+              <a:t>Copyright © 2023 SPIKE Prime Lessons (primelessons.org) CC-BY-NC-SA.  (Last edit: 5/12/2023)</a:t>
+            </a:r>
+            <a:endParaRPr lang="en-US" dirty="0"/>
+          </a:p>
+        </p:txBody>
+      </p:sp>
+      <p:sp>
+        <p:nvSpPr>
+          <p:cNvPr id="7" name="Slide Number Placeholder 6">
+            <a:extLst>
+              <a:ext uri="{FF2B5EF4-FFF2-40B4-BE49-F238E27FC236}">
+                <a16:creationId xmlns:a16="http://schemas.microsoft.com/office/drawing/2014/main" id="{F6739919-47A8-43E0-85A2-F648492C26DE}"/>
+              </a:ext>
+            </a:extLst>
+          </p:cNvPr>
+          <p:cNvSpPr>
+            <a:spLocks noGrp="1"/>
+          </p:cNvSpPr>
+          <p:nvPr>
+            <p:ph type="sldNum" sz="quarter" idx="12"/>
+          </p:nvPr>
+        </p:nvSpPr>
+        <p:spPr/>
+        <p:txBody>
+          <a:bodyPr/>
+          <a:lstStyle/>
+          <a:p>
+            <a:fld id="{BBD74847-7BE4-4E4D-8159-51DF7B93C616}" type="slidenum">
+              <a:rPr lang="en-US" smtClean="0"/>
+              <a:t>10</a:t>
+            </a:fld>
+            <a:endParaRPr lang="en-US"/>
+          </a:p>
+        </p:txBody>
+      </p:sp>
+      <p:sp>
+        <p:nvSpPr>
+          <p:cNvPr id="5" name="Rectangle 4"/>
+          <p:cNvSpPr>
+            <a:spLocks noChangeArrowheads="1"/>
+          </p:cNvSpPr>
+          <p:nvPr/>
+        </p:nvSpPr>
+        <p:spPr bwMode="auto">
+          <a:xfrm>
+            <a:off x="575029" y="5862802"/>
+            <a:ext cx="7734052" cy="369332"/>
+          </a:xfrm>
+          <a:prstGeom prst="rect">
+            <a:avLst/>
+          </a:prstGeom>
+          <a:solidFill>
+            <a:srgbClr val="F5F5F5"/>
+          </a:solidFill>
+          <a:ln>
+            <a:noFill/>
+          </a:ln>
+          <a:effectLst/>
+          <a:extLst>
+            <a:ext uri="{91240B29-F687-4f45-9708-019B960494DF}">
+              <a14:hiddenLine xmlns:a14="http://schemas.microsoft.com/office/drawing/2010/main" xmlns="" w="9525">
+                <a:solidFill>
+                  <a:schemeClr val="tx1"/>
+                </a:solidFill>
+                <a:miter lim="800000"/>
+                <a:headEnd/>
+                <a:tailEnd/>
+              </a14:hiddenLine>
+            </a:ext>
+            <a:ext uri="{AF507438-7753-43e0-B8FC-AC1667EBCBE1}">
+              <a14:hiddenEffects xmlns:a14="http://schemas.microsoft.com/office/drawing/2010/main" xmlns="">
+                <a:effectLst>
+                  <a:outerShdw dist="35921" dir="2700000" algn="ctr" rotWithShape="0">
+                    <a:schemeClr val="bg2"/>
+                  </a:outerShdw>
+                </a:effectLst>
+              </a14:hiddenEffects>
+            </a:ext>
+          </a:extLst>
+        </p:spPr>
+        <p:txBody>
+          <a:bodyPr vert="horz" wrap="square" lIns="0" tIns="0" rIns="0" bIns="0" numCol="1" anchor="ctr" anchorCtr="0" compatLnSpc="1">
+            <a:prstTxWarp prst="textNoShape">
+              <a:avLst/>
+            </a:prstTxWarp>
+            <a:spAutoFit/>
+          </a:bodyPr>
+          <a:lstStyle>
+            <a:lvl1pPr eaLnBrk="0" fontAlgn="base" hangingPunct="0">
+              <a:spcBef>
+                <a:spcPct val="0"/>
+              </a:spcBef>
+              <a:spcAft>
+                <a:spcPct val="0"/>
+              </a:spcAft>
+              <a:defRPr>
+                <a:solidFill>
+                  <a:schemeClr val="tx1"/>
+                </a:solidFill>
+                <a:latin typeface="Arial" panose="020B0604020202020204" pitchFamily="34" charset="0"/>
+              </a:defRPr>
+            </a:lvl1pPr>
+            <a:lvl2pPr eaLnBrk="0" fontAlgn="base" hangingPunct="0">
+              <a:spcBef>
+                <a:spcPct val="0"/>
+              </a:spcBef>
+              <a:spcAft>
+                <a:spcPct val="0"/>
+              </a:spcAft>
+              <a:defRPr>
+                <a:solidFill>
+                  <a:schemeClr val="tx1"/>
+                </a:solidFill>
+                <a:latin typeface="Arial" panose="020B0604020202020204" pitchFamily="34" charset="0"/>
+              </a:defRPr>
+            </a:lvl2pPr>
+            <a:lvl3pPr eaLnBrk="0" fontAlgn="base" hangingPunct="0">
+              <a:spcBef>
+                <a:spcPct val="0"/>
+              </a:spcBef>
+              <a:spcAft>
+                <a:spcPct val="0"/>
+              </a:spcAft>
+              <a:defRPr>
+                <a:solidFill>
+                  <a:schemeClr val="tx1"/>
+                </a:solidFill>
+                <a:latin typeface="Arial" panose="020B0604020202020204" pitchFamily="34" charset="0"/>
+              </a:defRPr>
+            </a:lvl3pPr>
+            <a:lvl4pPr eaLnBrk="0" fontAlgn="base" hangingPunct="0">
+              <a:spcBef>
+                <a:spcPct val="0"/>
+              </a:spcBef>
+              <a:spcAft>
+                <a:spcPct val="0"/>
+              </a:spcAft>
+              <a:defRPr>
+                <a:solidFill>
+                  <a:schemeClr val="tx1"/>
+                </a:solidFill>
+                <a:latin typeface="Arial" panose="020B0604020202020204" pitchFamily="34" charset="0"/>
+              </a:defRPr>
+            </a:lvl4pPr>
+            <a:lvl5pPr eaLnBrk="0" fontAlgn="base" hangingPunct="0">
+              <a:spcBef>
+                <a:spcPct val="0"/>
+              </a:spcBef>
+              <a:spcAft>
+                <a:spcPct val="0"/>
+              </a:spcAft>
+              <a:defRPr>
+                <a:solidFill>
+                  <a:schemeClr val="tx1"/>
+                </a:solidFill>
+                <a:latin typeface="Arial" panose="020B0604020202020204" pitchFamily="34" charset="0"/>
+              </a:defRPr>
+            </a:lvl5pPr>
+            <a:lvl6pPr eaLnBrk="0" fontAlgn="base" hangingPunct="0">
+              <a:spcBef>
+                <a:spcPct val="0"/>
+              </a:spcBef>
+              <a:spcAft>
+                <a:spcPct val="0"/>
+              </a:spcAft>
+              <a:defRPr>
+                <a:solidFill>
+                  <a:schemeClr val="tx1"/>
+                </a:solidFill>
+                <a:latin typeface="Arial" panose="020B0604020202020204" pitchFamily="34" charset="0"/>
+              </a:defRPr>
+            </a:lvl6pPr>
+            <a:lvl7pPr eaLnBrk="0" fontAlgn="base" hangingPunct="0">
+              <a:spcBef>
+                <a:spcPct val="0"/>
+              </a:spcBef>
+              <a:spcAft>
+                <a:spcPct val="0"/>
+              </a:spcAft>
+              <a:defRPr>
+                <a:solidFill>
+                  <a:schemeClr val="tx1"/>
+                </a:solidFill>
+                <a:latin typeface="Arial" panose="020B0604020202020204" pitchFamily="34" charset="0"/>
+              </a:defRPr>
+            </a:lvl7pPr>
+            <a:lvl8pPr eaLnBrk="0" fontAlgn="base" hangingPunct="0">
+              <a:spcBef>
+                <a:spcPct val="0"/>
+              </a:spcBef>
+              <a:spcAft>
+                <a:spcPct val="0"/>
+              </a:spcAft>
+              <a:defRPr>
+                <a:solidFill>
+                  <a:schemeClr val="tx1"/>
+                </a:solidFill>
+                <a:latin typeface="Arial" panose="020B0604020202020204" pitchFamily="34" charset="0"/>
+              </a:defRPr>
+            </a:lvl8pPr>
+            <a:lvl9pPr eaLnBrk="0" fontAlgn="base" hangingPunct="0">
+              <a:spcBef>
+                <a:spcPct val="0"/>
+              </a:spcBef>
+              <a:spcAft>
+                <a:spcPct val="0"/>
+              </a:spcAft>
+              <a:defRPr>
+                <a:solidFill>
+                  <a:schemeClr val="tx1"/>
+                </a:solidFill>
+                <a:latin typeface="Arial" panose="020B0604020202020204" pitchFamily="34" charset="0"/>
+              </a:defRPr>
+            </a:lvl9pPr>
+          </a:lstStyle>
+          <a:p>
+            <a:pPr marL="0" marR="0" lvl="0" indent="0" algn="ctr" defTabSz="914400" rtl="0" eaLnBrk="0" fontAlgn="base" latinLnBrk="0" hangingPunct="0">
+              <a:lnSpc>
+                <a:spcPct val="100000"/>
+              </a:lnSpc>
+              <a:spcBef>
+                <a:spcPct val="0"/>
+              </a:spcBef>
+              <a:spcAft>
+                <a:spcPct val="0"/>
+              </a:spcAft>
+              <a:buClrTx/>
+              <a:buSzTx/>
+              <a:buFontTx/>
+              <a:buNone/>
+              <a:tabLst/>
+            </a:pPr>
+            <a:r>
+              <a:rPr kumimoji="0" lang="en-US" altLang="en-US" sz="1200" b="0" i="0" u="none" strike="noStrike" cap="none" normalizeH="0" baseline="0" dirty="0">
+                <a:ln>
+                  <a:noFill/>
+                </a:ln>
+                <a:solidFill>
+                  <a:srgbClr val="4374B7"/>
+                </a:solidFill>
+                <a:effectLst/>
+                <a:latin typeface="Helvetica Neue"/>
+              </a:rPr>
+              <a:t>                         </a:t>
+            </a:r>
+            <a:br>
+              <a:rPr kumimoji="0" lang="en-US" altLang="en-US" sz="1050" b="0" i="0" u="none" strike="noStrike" cap="none" normalizeH="0" baseline="0" dirty="0">
+                <a:ln>
+                  <a:noFill/>
+                </a:ln>
+                <a:solidFill>
+                  <a:schemeClr val="tx1"/>
+                </a:solidFill>
+                <a:effectLst/>
+              </a:rPr>
+            </a:br>
+            <a:r>
+              <a:rPr kumimoji="0" lang="en-US" altLang="en-US" sz="1200" b="0" i="0" u="none" strike="noStrike" cap="none" normalizeH="0" baseline="0" dirty="0">
+                <a:ln>
+                  <a:noFill/>
+                </a:ln>
+                <a:solidFill>
+                  <a:srgbClr val="000000"/>
+                </a:solidFill>
+                <a:effectLst/>
+                <a:latin typeface="Helvetica Neue"/>
+              </a:rPr>
+              <a:t>This work is licensed under a </a:t>
+            </a:r>
+            <a:r>
+              <a:rPr kumimoji="0" lang="en-US" altLang="en-US" sz="1200" b="0" i="0" u="none" strike="noStrike" cap="none" normalizeH="0" baseline="0" dirty="0">
+                <a:ln>
+                  <a:noFill/>
+                </a:ln>
+                <a:solidFill>
+                  <a:srgbClr val="4374B7"/>
+                </a:solidFill>
+                <a:effectLst/>
+                <a:latin typeface="Helvetica Neue"/>
+                <a:hlinkClick r:id="rId2"/>
+              </a:rPr>
+              <a:t>Creative Commons Attribution-</a:t>
+            </a:r>
+            <a:r>
+              <a:rPr kumimoji="0" lang="en-US" altLang="en-US" sz="1200" b="0" i="0" u="none" strike="noStrike" cap="none" normalizeH="0" baseline="0" dirty="0" err="1">
+                <a:ln>
+                  <a:noFill/>
+                </a:ln>
+                <a:solidFill>
+                  <a:srgbClr val="4374B7"/>
+                </a:solidFill>
+                <a:effectLst/>
+                <a:latin typeface="Helvetica Neue"/>
+                <a:hlinkClick r:id="rId2"/>
+              </a:rPr>
+              <a:t>NonCommercial</a:t>
+            </a:r>
+            <a:r>
+              <a:rPr kumimoji="0" lang="en-US" altLang="en-US" sz="1200" b="0" i="0" u="none" strike="noStrike" cap="none" normalizeH="0" baseline="0" dirty="0">
+                <a:ln>
+                  <a:noFill/>
+                </a:ln>
+                <a:solidFill>
+                  <a:srgbClr val="4374B7"/>
+                </a:solidFill>
+                <a:effectLst/>
+                <a:latin typeface="Helvetica Neue"/>
+                <a:hlinkClick r:id="rId2"/>
+              </a:rPr>
+              <a:t>-</a:t>
+            </a:r>
+            <a:r>
+              <a:rPr kumimoji="0" lang="en-US" altLang="en-US" sz="1200" b="0" i="0" u="none" strike="noStrike" cap="none" normalizeH="0" baseline="0" dirty="0" err="1">
+                <a:ln>
+                  <a:noFill/>
+                </a:ln>
+                <a:solidFill>
+                  <a:srgbClr val="4374B7"/>
+                </a:solidFill>
+                <a:effectLst/>
+                <a:latin typeface="Helvetica Neue"/>
+                <a:hlinkClick r:id="rId2"/>
+              </a:rPr>
+              <a:t>ShareAlike</a:t>
+            </a:r>
+            <a:r>
+              <a:rPr kumimoji="0" lang="en-US" altLang="en-US" sz="1200" b="0" i="0" u="none" strike="noStrike" cap="none" normalizeH="0" baseline="0" dirty="0">
+                <a:ln>
+                  <a:noFill/>
+                </a:ln>
+                <a:solidFill>
+                  <a:srgbClr val="4374B7"/>
+                </a:solidFill>
+                <a:effectLst/>
+                <a:latin typeface="Helvetica Neue"/>
+                <a:hlinkClick r:id="rId2"/>
+              </a:rPr>
+              <a:t> 4.0 International License</a:t>
+            </a:r>
+            <a:r>
+              <a:rPr kumimoji="0" lang="en-US" altLang="en-US" sz="1200" b="0" i="0" u="none" strike="noStrike" cap="none" normalizeH="0" baseline="0" dirty="0">
+                <a:ln>
+                  <a:noFill/>
+                </a:ln>
+                <a:solidFill>
+                  <a:srgbClr val="000000"/>
+                </a:solidFill>
+                <a:effectLst/>
+                <a:latin typeface="Helvetica Neue"/>
+              </a:rPr>
+              <a:t>.</a:t>
+            </a:r>
+            <a:r>
+              <a:rPr kumimoji="0" lang="en-US" altLang="en-US" sz="1050" b="0" i="0" u="none" strike="noStrike" cap="none" normalizeH="0" baseline="0" dirty="0">
+                <a:ln>
+                  <a:noFill/>
+                </a:ln>
+                <a:solidFill>
+                  <a:schemeClr val="tx1"/>
+                </a:solidFill>
+                <a:effectLst/>
+              </a:rPr>
+              <a:t> </a:t>
+            </a:r>
+            <a:endParaRPr kumimoji="0" lang="en-US" altLang="en-US" sz="1200" b="0" i="0" u="none" strike="noStrike" cap="none" normalizeH="0" baseline="0" dirty="0">
+              <a:ln>
+                <a:noFill/>
+              </a:ln>
+              <a:solidFill>
+                <a:srgbClr val="4374B7"/>
+              </a:solidFill>
+              <a:effectLst/>
+              <a:latin typeface="Helvetica Neue"/>
+            </a:endParaRPr>
+          </a:p>
+        </p:txBody>
+      </p:sp>
+      <p:pic>
+        <p:nvPicPr>
+          <p:cNvPr id="6" name="Picture 5" descr="Creative Commons License">
+            <a:hlinkClick r:id="rId2"/>
+          </p:cNvPr>
+          <p:cNvPicPr>
+            <a:picLocks noChangeAspect="1" noChangeArrowheads="1"/>
+          </p:cNvPicPr>
+          <p:nvPr/>
+        </p:nvPicPr>
+        <p:blipFill>
+          <a:blip r:embed="rId3">
+            <a:extLst>
+              <a:ext uri="{28A0092B-C50C-407E-A947-70E740481C1C}">
+                <a14:useLocalDpi xmlns:a14="http://schemas.microsoft.com/office/drawing/2010/main" val="0"/>
+              </a:ext>
+            </a:extLst>
+          </a:blip>
+          <a:srcRect/>
+          <a:stretch>
+            <a:fillRect/>
+          </a:stretch>
+        </p:blipFill>
+        <p:spPr bwMode="auto">
+          <a:xfrm>
+            <a:off x="3702510" y="5253616"/>
+            <a:ext cx="1479091" cy="521045"/>
+          </a:xfrm>
+          <a:prstGeom prst="rect">
+            <a:avLst/>
+          </a:prstGeom>
+          <a:noFill/>
+          <a:extLst>
+            <a:ext uri="{909E8E84-426E-40dd-AFC4-6F175D3DCCD1}">
+              <a14:hiddenFill xmlns:a14="http://schemas.microsoft.com/office/drawing/2010/main" xmlns="">
+                <a:solidFill>
+                  <a:srgbClr val="FFFFFF"/>
+                </a:solidFill>
+              </a14:hiddenFill>
+            </a:ext>
+          </a:extLst>
+        </p:spPr>
+      </p:pic>
+    </p:spTree>
+    <p:extLst>
+      <p:ext uri="{BB962C8B-B14F-4D97-AF65-F5344CB8AC3E}">
+        <p14:creationId xmlns:p14="http://schemas.microsoft.com/office/powerpoint/2010/main" val="3392129947"/>
+      </p:ext>
+    </p:extLst>
+  </p:cSld>
+  <p:clrMapOvr>
+    <a:masterClrMapping/>
+  </p:clrMapOvr>
+</p:sld>
+</file>
+
 <file path=ppt/slides/slide2.xml><?xml version="1.0" encoding="utf-8"?>
 <p:sld xmlns:a="http://schemas.openxmlformats.org/drawingml/2006/main" xmlns:r="http://schemas.openxmlformats.org/officeDocument/2006/relationships" xmlns:p="http://schemas.openxmlformats.org/presentationml/2006/main">
   <p:cSld>
@@ -7642,7 +8167,7 @@
           <a:p>
             <a:r>
               <a:rPr lang="en-US" dirty="0"/>
-              <a:t>Note:  Although images in this lessons may show a SPIKE Prime, the code blocks are the may be a little different for Robot Inventor</a:t>
+              <a:t>Note:  Although images in this lessons may show a SPIKE Prime, the code blocks are the same for Robot Inventor</a:t>
             </a:r>
           </a:p>
           <a:p>
@@ -7725,6 +8250,263 @@
 </file>
 
 <file path=ppt/slides/slide3.xml><?xml version="1.0" encoding="utf-8"?>
+<p:sld xmlns:a="http://schemas.openxmlformats.org/drawingml/2006/main" xmlns:r="http://schemas.openxmlformats.org/officeDocument/2006/relationships" xmlns:p="http://schemas.openxmlformats.org/presentationml/2006/main">
+  <p:cSld>
+    <p:spTree>
+      <p:nvGrpSpPr>
+        <p:cNvPr id="1" name=""/>
+        <p:cNvGrpSpPr/>
+        <p:nvPr/>
+      </p:nvGrpSpPr>
+      <p:grpSpPr>
+        <a:xfrm>
+          <a:off x="0" y="0"/>
+          <a:ext cx="0" cy="0"/>
+          <a:chOff x="0" y="0"/>
+          <a:chExt cx="0" cy="0"/>
+        </a:xfrm>
+      </p:grpSpPr>
+      <p:sp>
+        <p:nvSpPr>
+          <p:cNvPr id="2" name="Title 1">
+            <a:extLst>
+              <a:ext uri="{FF2B5EF4-FFF2-40B4-BE49-F238E27FC236}">
+                <a16:creationId xmlns:a16="http://schemas.microsoft.com/office/drawing/2014/main" id="{FDD7EA66-03B5-44C5-0C09-01A6DF3AB7F3}"/>
+              </a:ext>
+            </a:extLst>
+          </p:cNvPr>
+          <p:cNvSpPr>
+            <a:spLocks noGrp="1"/>
+          </p:cNvSpPr>
+          <p:nvPr>
+            <p:ph type="title"/>
+          </p:nvPr>
+        </p:nvSpPr>
+        <p:spPr/>
+        <p:txBody>
+          <a:bodyPr/>
+          <a:lstStyle/>
+          <a:p>
+            <a:r>
+              <a:rPr lang="en-US" dirty="0"/>
+              <a:t>Bug In SPIKE 3</a:t>
+            </a:r>
+          </a:p>
+        </p:txBody>
+      </p:sp>
+      <p:sp>
+        <p:nvSpPr>
+          <p:cNvPr id="3" name="Content Placeholder 2">
+            <a:extLst>
+              <a:ext uri="{FF2B5EF4-FFF2-40B4-BE49-F238E27FC236}">
+                <a16:creationId xmlns:a16="http://schemas.microsoft.com/office/drawing/2014/main" id="{4B12F095-432A-BFFB-8C0E-5FACF7BC1E64}"/>
+              </a:ext>
+            </a:extLst>
+          </p:cNvPr>
+          <p:cNvSpPr>
+            <a:spLocks noGrp="1"/>
+          </p:cNvSpPr>
+          <p:nvPr>
+            <p:ph idx="1"/>
+          </p:nvPr>
+        </p:nvSpPr>
+        <p:spPr>
+          <a:xfrm>
+            <a:off x="155087" y="1140007"/>
+            <a:ext cx="5656989" cy="5079166"/>
+          </a:xfrm>
+        </p:spPr>
+        <p:txBody>
+          <a:bodyPr>
+            <a:normAutofit fontScale="85000" lnSpcReduction="10000"/>
+          </a:bodyPr>
+          <a:lstStyle/>
+          <a:p>
+            <a:r>
+              <a:rPr lang="en-US" dirty="0"/>
+              <a:t>The set yaw angle to 0 block takes a small amount of time to perform, but moves on to the next block before its is completed</a:t>
+            </a:r>
+          </a:p>
+          <a:p>
+            <a:r>
+              <a:rPr lang="en-US" dirty="0"/>
+              <a:t>The problem is that the code reaches the check for if the yaw angle &gt;90 before the yaw angle is reset, meaning that if the yaw angle read &gt;90 before the reset, the robot will not perform the turn</a:t>
+            </a:r>
+          </a:p>
+          <a:p>
+            <a:r>
+              <a:rPr lang="en-US" dirty="0"/>
+              <a:t>To fix this, you will have to add a wait block after the gyro reset block and before the turn. There are two ways you can do this</a:t>
+            </a:r>
+          </a:p>
+          <a:p>
+            <a:pPr lvl="1"/>
+            <a:r>
+              <a:rPr lang="en-US" dirty="0"/>
+              <a:t>Wait until the yaw angle reads 0</a:t>
+            </a:r>
+          </a:p>
+          <a:p>
+            <a:pPr lvl="1"/>
+            <a:r>
+              <a:rPr lang="en-US" dirty="0"/>
+              <a:t>Wait for a small amount of time (around 0.05 seconds seems to work)</a:t>
+            </a:r>
+          </a:p>
+          <a:p>
+            <a:r>
+              <a:rPr lang="en-US" dirty="0">
+                <a:solidFill>
+                  <a:srgbClr val="FF0000"/>
+                </a:solidFill>
+              </a:rPr>
+              <a:t>Note that some solutions provided in this lesson and other lessons involving turns/the gyro sensor may not contain this wait block</a:t>
+            </a:r>
+          </a:p>
+          <a:p>
+            <a:r>
+              <a:rPr lang="en-US" dirty="0">
+                <a:solidFill>
+                  <a:srgbClr val="FF0000"/>
+                </a:solidFill>
+              </a:rPr>
+              <a:t>The code will function as intended in a standalone program since the gyro is reset at the beginning of all programs automatically, but may need the addition of one of these methods for your use until an update fixing this bug is released</a:t>
+            </a:r>
+          </a:p>
+        </p:txBody>
+      </p:sp>
+      <p:sp>
+        <p:nvSpPr>
+          <p:cNvPr id="4" name="Footer Placeholder 3">
+            <a:extLst>
+              <a:ext uri="{FF2B5EF4-FFF2-40B4-BE49-F238E27FC236}">
+                <a16:creationId xmlns:a16="http://schemas.microsoft.com/office/drawing/2014/main" id="{69293738-00C4-1783-DE5A-A81F1CC5CE76}"/>
+              </a:ext>
+            </a:extLst>
+          </p:cNvPr>
+          <p:cNvSpPr>
+            <a:spLocks noGrp="1"/>
+          </p:cNvSpPr>
+          <p:nvPr>
+            <p:ph type="ftr" sz="quarter" idx="11"/>
+          </p:nvPr>
+        </p:nvSpPr>
+        <p:spPr/>
+        <p:txBody>
+          <a:bodyPr/>
+          <a:lstStyle/>
+          <a:p>
+            <a:r>
+              <a:rPr lang="en-US"/>
+              <a:t>Copyright © 2023 Prime Lessons (primelessons.org) CC-BY-NC-SA.  (Last edit: 5/12/2023)</a:t>
+            </a:r>
+            <a:endParaRPr lang="en-US" dirty="0"/>
+          </a:p>
+        </p:txBody>
+      </p:sp>
+      <p:sp>
+        <p:nvSpPr>
+          <p:cNvPr id="5" name="Slide Number Placeholder 4">
+            <a:extLst>
+              <a:ext uri="{FF2B5EF4-FFF2-40B4-BE49-F238E27FC236}">
+                <a16:creationId xmlns:a16="http://schemas.microsoft.com/office/drawing/2014/main" id="{9FAED9BE-A903-4408-191C-3880D5E70FD4}"/>
+              </a:ext>
+            </a:extLst>
+          </p:cNvPr>
+          <p:cNvSpPr>
+            <a:spLocks noGrp="1"/>
+          </p:cNvSpPr>
+          <p:nvPr>
+            <p:ph type="sldNum" sz="quarter" idx="12"/>
+          </p:nvPr>
+        </p:nvSpPr>
+        <p:spPr/>
+        <p:txBody>
+          <a:bodyPr/>
+          <a:lstStyle/>
+          <a:p>
+            <a:fld id="{BBD74847-7BE4-4E4D-8159-51DF7B93C616}" type="slidenum">
+              <a:rPr lang="en-US" smtClean="0"/>
+              <a:t>3</a:t>
+            </a:fld>
+            <a:endParaRPr lang="en-US"/>
+          </a:p>
+        </p:txBody>
+      </p:sp>
+      <p:pic>
+        <p:nvPicPr>
+          <p:cNvPr id="7" name="Picture 6">
+            <a:extLst>
+              <a:ext uri="{FF2B5EF4-FFF2-40B4-BE49-F238E27FC236}">
+                <a16:creationId xmlns:a16="http://schemas.microsoft.com/office/drawing/2014/main" id="{503F3E31-4E2F-0342-7D0B-3868F95DA3EB}"/>
+              </a:ext>
+            </a:extLst>
+          </p:cNvPr>
+          <p:cNvPicPr>
+            <a:picLocks noChangeAspect="1"/>
+          </p:cNvPicPr>
+          <p:nvPr/>
+        </p:nvPicPr>
+        <p:blipFill>
+          <a:blip r:embed="rId2"/>
+          <a:stretch>
+            <a:fillRect/>
+          </a:stretch>
+        </p:blipFill>
+        <p:spPr>
+          <a:xfrm>
+            <a:off x="6313737" y="4013223"/>
+            <a:ext cx="1961979" cy="1146830"/>
+          </a:xfrm>
+          <a:prstGeom prst="rect">
+            <a:avLst/>
+          </a:prstGeom>
+        </p:spPr>
+      </p:pic>
+      <p:pic>
+        <p:nvPicPr>
+          <p:cNvPr id="9" name="Picture 8">
+            <a:extLst>
+              <a:ext uri="{FF2B5EF4-FFF2-40B4-BE49-F238E27FC236}">
+                <a16:creationId xmlns:a16="http://schemas.microsoft.com/office/drawing/2014/main" id="{D5BDF7AC-FB1F-7BB7-6240-537F362FC833}"/>
+              </a:ext>
+            </a:extLst>
+          </p:cNvPr>
+          <p:cNvPicPr>
+            <a:picLocks noChangeAspect="1"/>
+          </p:cNvPicPr>
+          <p:nvPr/>
+        </p:nvPicPr>
+        <p:blipFill>
+          <a:blip r:embed="rId3"/>
+          <a:stretch>
+            <a:fillRect/>
+          </a:stretch>
+        </p:blipFill>
+        <p:spPr>
+          <a:xfrm>
+            <a:off x="5743895" y="2401256"/>
+            <a:ext cx="3262945" cy="1124819"/>
+          </a:xfrm>
+          <a:prstGeom prst="rect">
+            <a:avLst/>
+          </a:prstGeom>
+        </p:spPr>
+      </p:pic>
+    </p:spTree>
+    <p:extLst>
+      <p:ext uri="{BB962C8B-B14F-4D97-AF65-F5344CB8AC3E}">
+        <p14:creationId xmlns:p14="http://schemas.microsoft.com/office/powerpoint/2010/main" val="1764586712"/>
+      </p:ext>
+    </p:extLst>
+  </p:cSld>
+  <p:clrMapOvr>
+    <a:masterClrMapping/>
+  </p:clrMapOvr>
+</p:sld>
+</file>
+
+<file path=ppt/slides/slide4.xml><?xml version="1.0" encoding="utf-8"?>
 <p:sld xmlns:a="http://schemas.openxmlformats.org/drawingml/2006/main" xmlns:r="http://schemas.openxmlformats.org/officeDocument/2006/relationships" xmlns:p="http://schemas.openxmlformats.org/presentationml/2006/main">
   <p:cSld>
     <p:spTree>
@@ -7961,7 +8743,7 @@
           <a:p>
             <a:fld id="{BBD74847-7BE4-4E4D-8159-51DF7B93C616}" type="slidenum">
               <a:rPr lang="en-US" smtClean="0"/>
-              <a:t>3</a:t>
+              <a:t>4</a:t>
             </a:fld>
             <a:endParaRPr lang="en-US"/>
           </a:p>
@@ -7971,212 +8753,6 @@
     <p:extLst>
       <p:ext uri="{BB962C8B-B14F-4D97-AF65-F5344CB8AC3E}">
         <p14:creationId xmlns:p14="http://schemas.microsoft.com/office/powerpoint/2010/main" val="3015443631"/>
-      </p:ext>
-    </p:extLst>
-  </p:cSld>
-  <p:clrMapOvr>
-    <a:masterClrMapping/>
-  </p:clrMapOvr>
-</p:sld>
-</file>
-
-<file path=ppt/slides/slide4.xml><?xml version="1.0" encoding="utf-8"?>
-<p:sld xmlns:a="http://schemas.openxmlformats.org/drawingml/2006/main" xmlns:r="http://schemas.openxmlformats.org/officeDocument/2006/relationships" xmlns:p="http://schemas.openxmlformats.org/presentationml/2006/main">
-  <p:cSld>
-    <p:spTree>
-      <p:nvGrpSpPr>
-        <p:cNvPr id="1" name=""/>
-        <p:cNvGrpSpPr/>
-        <p:nvPr/>
-      </p:nvGrpSpPr>
-      <p:grpSpPr>
-        <a:xfrm>
-          <a:off x="0" y="0"/>
-          <a:ext cx="0" cy="0"/>
-          <a:chOff x="0" y="0"/>
-          <a:chExt cx="0" cy="0"/>
-        </a:xfrm>
-      </p:grpSpPr>
-      <p:sp>
-        <p:nvSpPr>
-          <p:cNvPr id="2" name="Title 1">
-            <a:extLst>
-              <a:ext uri="{FF2B5EF4-FFF2-40B4-BE49-F238E27FC236}">
-                <a16:creationId xmlns:a16="http://schemas.microsoft.com/office/drawing/2014/main" id="{8E1EAD8F-3E20-4455-80A6-24C89D8E2600}"/>
-              </a:ext>
-            </a:extLst>
-          </p:cNvPr>
-          <p:cNvSpPr>
-            <a:spLocks noGrp="1"/>
-          </p:cNvSpPr>
-          <p:nvPr>
-            <p:ph type="title"/>
-          </p:nvPr>
-        </p:nvSpPr>
-        <p:spPr/>
-        <p:txBody>
-          <a:bodyPr/>
-          <a:lstStyle/>
-          <a:p>
-            <a:r>
-              <a:rPr lang="en-US" dirty="0"/>
-              <a:t>Improving pivot Turn Accuracy</a:t>
-            </a:r>
-          </a:p>
-        </p:txBody>
-      </p:sp>
-      <p:sp>
-        <p:nvSpPr>
-          <p:cNvPr id="3" name="Content Placeholder 2">
-            <a:extLst>
-              <a:ext uri="{FF2B5EF4-FFF2-40B4-BE49-F238E27FC236}">
-                <a16:creationId xmlns:a16="http://schemas.microsoft.com/office/drawing/2014/main" id="{1AE70EB5-AEDC-463F-AF25-60473C7A36B6}"/>
-              </a:ext>
-            </a:extLst>
-          </p:cNvPr>
-          <p:cNvSpPr>
-            <a:spLocks noGrp="1"/>
-          </p:cNvSpPr>
-          <p:nvPr>
-            <p:ph idx="1"/>
-          </p:nvPr>
-        </p:nvSpPr>
-        <p:spPr>
-          <a:xfrm>
-            <a:off x="155088" y="1140006"/>
-            <a:ext cx="4543912" cy="5082601"/>
-          </a:xfrm>
-        </p:spPr>
-        <p:txBody>
-          <a:bodyPr/>
-          <a:lstStyle/>
-          <a:p>
-            <a:r>
-              <a:rPr lang="en-US" dirty="0"/>
-              <a:t>As we mentioned on the previous slide, using Droid Bot IV at 50% Speed, the robot turns 102 degrees instead of 90 degrees.</a:t>
-            </a:r>
-          </a:p>
-          <a:p>
-            <a:pPr lvl="1"/>
-            <a:r>
-              <a:rPr lang="en-US" dirty="0"/>
-              <a:t>How do we solve this problem?</a:t>
-            </a:r>
-          </a:p>
-          <a:p>
-            <a:pPr lvl="1"/>
-            <a:r>
-              <a:rPr lang="en-US" dirty="0"/>
-              <a:t>One solution is to ask it to turn 12 degrees less for Droid Bot IV </a:t>
-            </a:r>
-          </a:p>
-          <a:p>
-            <a:pPr lvl="1"/>
-            <a:r>
-              <a:rPr lang="en-US" dirty="0"/>
-              <a:t>The amount to reduce your turn will depend on the speed of your turn and your robot’s physical design. You will need to try some values to get this right. </a:t>
-            </a:r>
-          </a:p>
-          <a:p>
-            <a:r>
-              <a:rPr lang="en-US" dirty="0"/>
-              <a:t>The code on the right performs a 90 degree turn using Droid Bot IV using this method.</a:t>
-            </a:r>
-          </a:p>
-        </p:txBody>
-      </p:sp>
-      <p:sp>
-        <p:nvSpPr>
-          <p:cNvPr id="4" name="Footer Placeholder 3">
-            <a:extLst>
-              <a:ext uri="{FF2B5EF4-FFF2-40B4-BE49-F238E27FC236}">
-                <a16:creationId xmlns:a16="http://schemas.microsoft.com/office/drawing/2014/main" id="{ED34C484-3133-47D0-AB41-09BD58F0586D}"/>
-              </a:ext>
-            </a:extLst>
-          </p:cNvPr>
-          <p:cNvSpPr>
-            <a:spLocks noGrp="1"/>
-          </p:cNvSpPr>
-          <p:nvPr>
-            <p:ph type="ftr" sz="quarter" idx="11"/>
-          </p:nvPr>
-        </p:nvSpPr>
-        <p:spPr/>
-        <p:txBody>
-          <a:bodyPr/>
-          <a:lstStyle/>
-          <a:p>
-            <a:r>
-              <a:rPr lang="en-US"/>
-              <a:t>Copyright © 2023 SPIKE Prime Lessons (primelessons.org) CC-BY-NC-SA.  (Last edit: 5/12/2023)</a:t>
-            </a:r>
-            <a:endParaRPr lang="en-US" dirty="0"/>
-          </a:p>
-        </p:txBody>
-      </p:sp>
-      <p:sp>
-        <p:nvSpPr>
-          <p:cNvPr id="5" name="Slide Number Placeholder 4">
-            <a:extLst>
-              <a:ext uri="{FF2B5EF4-FFF2-40B4-BE49-F238E27FC236}">
-                <a16:creationId xmlns:a16="http://schemas.microsoft.com/office/drawing/2014/main" id="{BCFB99B6-E836-47F9-9AF6-21A29F50186F}"/>
-              </a:ext>
-            </a:extLst>
-          </p:cNvPr>
-          <p:cNvSpPr>
-            <a:spLocks noGrp="1"/>
-          </p:cNvSpPr>
-          <p:nvPr>
-            <p:ph type="sldNum" sz="quarter" idx="12"/>
-          </p:nvPr>
-        </p:nvSpPr>
-        <p:spPr/>
-        <p:txBody>
-          <a:bodyPr/>
-          <a:lstStyle/>
-          <a:p>
-            <a:fld id="{BBD74847-7BE4-4E4D-8159-51DF7B93C616}" type="slidenum">
-              <a:rPr lang="en-US" smtClean="0"/>
-              <a:t>4</a:t>
-            </a:fld>
-            <a:endParaRPr lang="en-US"/>
-          </a:p>
-        </p:txBody>
-      </p:sp>
-      <p:pic>
-        <p:nvPicPr>
-          <p:cNvPr id="11" name="Picture 10">
-            <a:extLst>
-              <a:ext uri="{FF2B5EF4-FFF2-40B4-BE49-F238E27FC236}">
-                <a16:creationId xmlns:a16="http://schemas.microsoft.com/office/drawing/2014/main" id="{912BAF4D-AAC5-B572-1771-8DC039B66FBC}"/>
-              </a:ext>
-            </a:extLst>
-          </p:cNvPr>
-          <p:cNvPicPr>
-            <a:picLocks noChangeAspect="1"/>
-          </p:cNvPicPr>
-          <p:nvPr/>
-        </p:nvPicPr>
-        <p:blipFill>
-          <a:blip r:embed="rId2"/>
-          <a:stretch>
-            <a:fillRect/>
-          </a:stretch>
-        </p:blipFill>
-        <p:spPr>
-          <a:xfrm>
-            <a:off x="4980497" y="1494174"/>
-            <a:ext cx="3843464" cy="3937846"/>
-          </a:xfrm>
-          <a:prstGeom prst="rect">
-            <a:avLst/>
-          </a:prstGeom>
-        </p:spPr>
-      </p:pic>
-    </p:spTree>
-    <p:extLst>
-      <p:ext uri="{BB962C8B-B14F-4D97-AF65-F5344CB8AC3E}">
-        <p14:creationId xmlns:p14="http://schemas.microsoft.com/office/powerpoint/2010/main" val="3657056520"/>
       </p:ext>
     </p:extLst>
   </p:cSld>
@@ -8205,6 +8781,212 @@
       </p:grpSpPr>
       <p:sp>
         <p:nvSpPr>
+          <p:cNvPr id="2" name="Title 1">
+            <a:extLst>
+              <a:ext uri="{FF2B5EF4-FFF2-40B4-BE49-F238E27FC236}">
+                <a16:creationId xmlns:a16="http://schemas.microsoft.com/office/drawing/2014/main" id="{8E1EAD8F-3E20-4455-80A6-24C89D8E2600}"/>
+              </a:ext>
+            </a:extLst>
+          </p:cNvPr>
+          <p:cNvSpPr>
+            <a:spLocks noGrp="1"/>
+          </p:cNvSpPr>
+          <p:nvPr>
+            <p:ph type="title"/>
+          </p:nvPr>
+        </p:nvSpPr>
+        <p:spPr/>
+        <p:txBody>
+          <a:bodyPr/>
+          <a:lstStyle/>
+          <a:p>
+            <a:r>
+              <a:rPr lang="en-US" dirty="0"/>
+              <a:t>Improving pivot Turn Accuracy</a:t>
+            </a:r>
+          </a:p>
+        </p:txBody>
+      </p:sp>
+      <p:sp>
+        <p:nvSpPr>
+          <p:cNvPr id="3" name="Content Placeholder 2">
+            <a:extLst>
+              <a:ext uri="{FF2B5EF4-FFF2-40B4-BE49-F238E27FC236}">
+                <a16:creationId xmlns:a16="http://schemas.microsoft.com/office/drawing/2014/main" id="{1AE70EB5-AEDC-463F-AF25-60473C7A36B6}"/>
+              </a:ext>
+            </a:extLst>
+          </p:cNvPr>
+          <p:cNvSpPr>
+            <a:spLocks noGrp="1"/>
+          </p:cNvSpPr>
+          <p:nvPr>
+            <p:ph idx="1"/>
+          </p:nvPr>
+        </p:nvSpPr>
+        <p:spPr>
+          <a:xfrm>
+            <a:off x="155088" y="1140006"/>
+            <a:ext cx="4543912" cy="5082601"/>
+          </a:xfrm>
+        </p:spPr>
+        <p:txBody>
+          <a:bodyPr/>
+          <a:lstStyle/>
+          <a:p>
+            <a:r>
+              <a:rPr lang="en-US" dirty="0"/>
+              <a:t>As we mentioned on the previous slide, using Droid Bot IV at 50% Speed, the robot turns 102 degrees instead of 90 degrees.</a:t>
+            </a:r>
+          </a:p>
+          <a:p>
+            <a:pPr lvl="1"/>
+            <a:r>
+              <a:rPr lang="en-US" dirty="0"/>
+              <a:t>How do we solve this problem?</a:t>
+            </a:r>
+          </a:p>
+          <a:p>
+            <a:pPr lvl="1"/>
+            <a:r>
+              <a:rPr lang="en-US" dirty="0"/>
+              <a:t>One solution is to ask it to turn 12 degrees less for Droid Bot IV </a:t>
+            </a:r>
+          </a:p>
+          <a:p>
+            <a:pPr lvl="1"/>
+            <a:r>
+              <a:rPr lang="en-US" dirty="0"/>
+              <a:t>The amount to reduce your turn will depend on the speed of your turn and your robot’s physical design. You will need to try some values to get this right. </a:t>
+            </a:r>
+          </a:p>
+          <a:p>
+            <a:r>
+              <a:rPr lang="en-US" dirty="0"/>
+              <a:t>The code on the right performs a 90 degree turn using Droid Bot IV using this method.</a:t>
+            </a:r>
+          </a:p>
+        </p:txBody>
+      </p:sp>
+      <p:sp>
+        <p:nvSpPr>
+          <p:cNvPr id="4" name="Footer Placeholder 3">
+            <a:extLst>
+              <a:ext uri="{FF2B5EF4-FFF2-40B4-BE49-F238E27FC236}">
+                <a16:creationId xmlns:a16="http://schemas.microsoft.com/office/drawing/2014/main" id="{ED34C484-3133-47D0-AB41-09BD58F0586D}"/>
+              </a:ext>
+            </a:extLst>
+          </p:cNvPr>
+          <p:cNvSpPr>
+            <a:spLocks noGrp="1"/>
+          </p:cNvSpPr>
+          <p:nvPr>
+            <p:ph type="ftr" sz="quarter" idx="11"/>
+          </p:nvPr>
+        </p:nvSpPr>
+        <p:spPr/>
+        <p:txBody>
+          <a:bodyPr/>
+          <a:lstStyle/>
+          <a:p>
+            <a:r>
+              <a:rPr lang="en-US"/>
+              <a:t>Copyright © 2023 SPIKE Prime Lessons (primelessons.org) CC-BY-NC-SA.  (Last edit: 5/12/2023)</a:t>
+            </a:r>
+            <a:endParaRPr lang="en-US" dirty="0"/>
+          </a:p>
+        </p:txBody>
+      </p:sp>
+      <p:sp>
+        <p:nvSpPr>
+          <p:cNvPr id="5" name="Slide Number Placeholder 4">
+            <a:extLst>
+              <a:ext uri="{FF2B5EF4-FFF2-40B4-BE49-F238E27FC236}">
+                <a16:creationId xmlns:a16="http://schemas.microsoft.com/office/drawing/2014/main" id="{BCFB99B6-E836-47F9-9AF6-21A29F50186F}"/>
+              </a:ext>
+            </a:extLst>
+          </p:cNvPr>
+          <p:cNvSpPr>
+            <a:spLocks noGrp="1"/>
+          </p:cNvSpPr>
+          <p:nvPr>
+            <p:ph type="sldNum" sz="quarter" idx="12"/>
+          </p:nvPr>
+        </p:nvSpPr>
+        <p:spPr/>
+        <p:txBody>
+          <a:bodyPr/>
+          <a:lstStyle/>
+          <a:p>
+            <a:fld id="{BBD74847-7BE4-4E4D-8159-51DF7B93C616}" type="slidenum">
+              <a:rPr lang="en-US" smtClean="0"/>
+              <a:t>5</a:t>
+            </a:fld>
+            <a:endParaRPr lang="en-US"/>
+          </a:p>
+        </p:txBody>
+      </p:sp>
+      <p:pic>
+        <p:nvPicPr>
+          <p:cNvPr id="11" name="Picture 10">
+            <a:extLst>
+              <a:ext uri="{FF2B5EF4-FFF2-40B4-BE49-F238E27FC236}">
+                <a16:creationId xmlns:a16="http://schemas.microsoft.com/office/drawing/2014/main" id="{912BAF4D-AAC5-B572-1771-8DC039B66FBC}"/>
+              </a:ext>
+            </a:extLst>
+          </p:cNvPr>
+          <p:cNvPicPr>
+            <a:picLocks noChangeAspect="1"/>
+          </p:cNvPicPr>
+          <p:nvPr/>
+        </p:nvPicPr>
+        <p:blipFill>
+          <a:blip r:embed="rId2"/>
+          <a:stretch>
+            <a:fillRect/>
+          </a:stretch>
+        </p:blipFill>
+        <p:spPr>
+          <a:xfrm>
+            <a:off x="4980497" y="1494174"/>
+            <a:ext cx="3843464" cy="3937846"/>
+          </a:xfrm>
+          <a:prstGeom prst="rect">
+            <a:avLst/>
+          </a:prstGeom>
+        </p:spPr>
+      </p:pic>
+    </p:spTree>
+    <p:extLst>
+      <p:ext uri="{BB962C8B-B14F-4D97-AF65-F5344CB8AC3E}">
+        <p14:creationId xmlns:p14="http://schemas.microsoft.com/office/powerpoint/2010/main" val="3657056520"/>
+      </p:ext>
+    </p:extLst>
+  </p:cSld>
+  <p:clrMapOvr>
+    <a:masterClrMapping/>
+  </p:clrMapOvr>
+</p:sld>
+</file>
+
+<file path=ppt/slides/slide6.xml><?xml version="1.0" encoding="utf-8"?>
+<p:sld xmlns:a="http://schemas.openxmlformats.org/drawingml/2006/main" xmlns:r="http://schemas.openxmlformats.org/officeDocument/2006/relationships" xmlns:p="http://schemas.openxmlformats.org/presentationml/2006/main">
+  <p:cSld>
+    <p:spTree>
+      <p:nvGrpSpPr>
+        <p:cNvPr id="1" name=""/>
+        <p:cNvGrpSpPr/>
+        <p:nvPr/>
+      </p:nvGrpSpPr>
+      <p:grpSpPr>
+        <a:xfrm>
+          <a:off x="0" y="0"/>
+          <a:ext cx="0" cy="0"/>
+          <a:chOff x="0" y="0"/>
+          <a:chExt cx="0" cy="0"/>
+        </a:xfrm>
+      </p:grpSpPr>
+      <p:sp>
+        <p:nvSpPr>
           <p:cNvPr id="3" name="Content Placeholder 2">
             <a:extLst>
               <a:ext uri="{FF2B5EF4-FFF2-40B4-BE49-F238E27FC236}">
@@ -8402,7 +9184,7 @@
           <a:p>
             <a:fld id="{BBD74847-7BE4-4E4D-8159-51DF7B93C616}" type="slidenum">
               <a:rPr lang="en-US" smtClean="0"/>
-              <a:t>5</a:t>
+              <a:t>6</a:t>
             </a:fld>
             <a:endParaRPr lang="en-US"/>
           </a:p>
@@ -8809,7 +9591,7 @@
 </p:sld>
 </file>
 
-<file path=ppt/slides/slide6.xml><?xml version="1.0" encoding="utf-8"?>
+<file path=ppt/slides/slide7.xml><?xml version="1.0" encoding="utf-8"?>
 <p:sld xmlns:a="http://schemas.openxmlformats.org/drawingml/2006/main" xmlns:r="http://schemas.openxmlformats.org/officeDocument/2006/relationships" xmlns:p="http://schemas.openxmlformats.org/presentationml/2006/main">
   <p:cSld>
     <p:spTree>
@@ -8984,7 +9766,7 @@
           <a:p>
             <a:fld id="{BBD74847-7BE4-4E4D-8159-51DF7B93C616}" type="slidenum">
               <a:rPr lang="en-US" smtClean="0"/>
-              <a:t>6</a:t>
+              <a:t>7</a:t>
             </a:fld>
             <a:endParaRPr lang="en-US"/>
           </a:p>
@@ -9487,7 +10269,7 @@
 </p:sld>
 </file>
 
-<file path=ppt/slides/slide7.xml><?xml version="1.0" encoding="utf-8"?>
+<file path=ppt/slides/slide8.xml><?xml version="1.0" encoding="utf-8"?>
 <p:sld xmlns:a="http://schemas.openxmlformats.org/drawingml/2006/main" xmlns:r="http://schemas.openxmlformats.org/officeDocument/2006/relationships" xmlns:p="http://schemas.openxmlformats.org/presentationml/2006/main">
   <p:cSld>
     <p:spTree>
@@ -9632,7 +10414,7 @@
           <a:p>
             <a:fld id="{BBD74847-7BE4-4E4D-8159-51DF7B93C616}" type="slidenum">
               <a:rPr lang="en-US" smtClean="0"/>
-              <a:t>7</a:t>
+              <a:t>8</a:t>
             </a:fld>
             <a:endParaRPr lang="en-US"/>
           </a:p>
@@ -10069,7 +10851,7 @@
 </p:sld>
 </file>
 
-<file path=ppt/slides/slide8.xml><?xml version="1.0" encoding="utf-8"?>
+<file path=ppt/slides/slide9.xml><?xml version="1.0" encoding="utf-8"?>
 <p:sld xmlns:a="http://schemas.openxmlformats.org/drawingml/2006/main" xmlns:r="http://schemas.openxmlformats.org/officeDocument/2006/relationships" xmlns:p="http://schemas.openxmlformats.org/presentationml/2006/main">
   <p:cSld>
     <p:spTree>
@@ -10284,7 +11066,7 @@
           <a:p>
             <a:fld id="{BBD74847-7BE4-4E4D-8159-51DF7B93C616}" type="slidenum">
               <a:rPr lang="en-US" smtClean="0"/>
-              <a:t>8</a:t>
+              <a:t>9</a:t>
             </a:fld>
             <a:endParaRPr lang="en-US"/>
           </a:p>
@@ -10324,530 +11106,6 @@
     <p:extLst>
       <p:ext uri="{BB962C8B-B14F-4D97-AF65-F5344CB8AC3E}">
         <p14:creationId xmlns:p14="http://schemas.microsoft.com/office/powerpoint/2010/main" val="3781426001"/>
-      </p:ext>
-    </p:extLst>
-  </p:cSld>
-  <p:clrMapOvr>
-    <a:masterClrMapping/>
-  </p:clrMapOvr>
-</p:sld>
-</file>
-
-<file path=ppt/slides/slide9.xml><?xml version="1.0" encoding="utf-8"?>
-<p:sld xmlns:a="http://schemas.openxmlformats.org/drawingml/2006/main" xmlns:r="http://schemas.openxmlformats.org/officeDocument/2006/relationships" xmlns:p="http://schemas.openxmlformats.org/presentationml/2006/main">
-  <p:cSld>
-    <p:spTree>
-      <p:nvGrpSpPr>
-        <p:cNvPr id="1" name=""/>
-        <p:cNvGrpSpPr/>
-        <p:nvPr/>
-      </p:nvGrpSpPr>
-      <p:grpSpPr>
-        <a:xfrm>
-          <a:off x="0" y="0"/>
-          <a:ext cx="0" cy="0"/>
-          <a:chOff x="0" y="0"/>
-          <a:chExt cx="0" cy="0"/>
-        </a:xfrm>
-      </p:grpSpPr>
-      <p:sp>
-        <p:nvSpPr>
-          <p:cNvPr id="2" name="Title 1"/>
-          <p:cNvSpPr>
-            <a:spLocks noGrp="1"/>
-          </p:cNvSpPr>
-          <p:nvPr>
-            <p:ph type="title"/>
-          </p:nvPr>
-        </p:nvSpPr>
-        <p:spPr/>
-        <p:txBody>
-          <a:bodyPr/>
-          <a:lstStyle/>
-          <a:p>
-            <a:r>
-              <a:rPr lang="en-US" dirty="0"/>
-              <a:t>CREDITS</a:t>
-            </a:r>
-          </a:p>
-        </p:txBody>
-      </p:sp>
-      <p:sp>
-        <p:nvSpPr>
-          <p:cNvPr id="3" name="Content Placeholder 2"/>
-          <p:cNvSpPr>
-            <a:spLocks noGrp="1"/>
-          </p:cNvSpPr>
-          <p:nvPr>
-            <p:ph idx="1"/>
-          </p:nvPr>
-        </p:nvSpPr>
-        <p:spPr>
-          <a:xfrm>
-            <a:off x="457200" y="1317983"/>
-            <a:ext cx="8245474" cy="1145345"/>
-          </a:xfrm>
-        </p:spPr>
-        <p:txBody>
-          <a:bodyPr>
-            <a:normAutofit/>
-          </a:bodyPr>
-          <a:lstStyle/>
-          <a:p>
-            <a:r>
-              <a:rPr lang="en-US" sz="1600" dirty="0"/>
-              <a:t>This lesson was created by Sanjay Seshan and Arvind Seshan for SPIKE Prime Lessons</a:t>
-            </a:r>
-          </a:p>
-          <a:p>
-            <a:r>
-              <a:rPr lang="en-US" sz="1600" dirty="0"/>
-              <a:t>More lessons are available at www.primelessons.org</a:t>
-            </a:r>
-          </a:p>
-        </p:txBody>
-      </p:sp>
-      <p:sp>
-        <p:nvSpPr>
-          <p:cNvPr id="4" name="Footer Placeholder 3"/>
-          <p:cNvSpPr>
-            <a:spLocks noGrp="1"/>
-          </p:cNvSpPr>
-          <p:nvPr>
-            <p:ph type="ftr" sz="quarter" idx="11"/>
-          </p:nvPr>
-        </p:nvSpPr>
-        <p:spPr/>
-        <p:txBody>
-          <a:bodyPr/>
-          <a:lstStyle/>
-          <a:p>
-            <a:r>
-              <a:rPr lang="en-US"/>
-              <a:t>Copyright © 2023 SPIKE Prime Lessons (primelessons.org) CC-BY-NC-SA.  (Last edit: 5/12/2023)</a:t>
-            </a:r>
-            <a:endParaRPr lang="en-US" dirty="0"/>
-          </a:p>
-        </p:txBody>
-      </p:sp>
-      <p:sp>
-        <p:nvSpPr>
-          <p:cNvPr id="7" name="Slide Number Placeholder 6">
-            <a:extLst>
-              <a:ext uri="{FF2B5EF4-FFF2-40B4-BE49-F238E27FC236}">
-                <a16:creationId xmlns:a16="http://schemas.microsoft.com/office/drawing/2014/main" id="{F6739919-47A8-43E0-85A2-F648492C26DE}"/>
-              </a:ext>
-            </a:extLst>
-          </p:cNvPr>
-          <p:cNvSpPr>
-            <a:spLocks noGrp="1"/>
-          </p:cNvSpPr>
-          <p:nvPr>
-            <p:ph type="sldNum" sz="quarter" idx="12"/>
-          </p:nvPr>
-        </p:nvSpPr>
-        <p:spPr/>
-        <p:txBody>
-          <a:bodyPr/>
-          <a:lstStyle/>
-          <a:p>
-            <a:fld id="{BBD74847-7BE4-4E4D-8159-51DF7B93C616}" type="slidenum">
-              <a:rPr lang="en-US" smtClean="0"/>
-              <a:t>9</a:t>
-            </a:fld>
-            <a:endParaRPr lang="en-US"/>
-          </a:p>
-        </p:txBody>
-      </p:sp>
-      <p:sp>
-        <p:nvSpPr>
-          <p:cNvPr id="5" name="Rectangle 4"/>
-          <p:cNvSpPr>
-            <a:spLocks noChangeArrowheads="1"/>
-          </p:cNvSpPr>
-          <p:nvPr/>
-        </p:nvSpPr>
-        <p:spPr bwMode="auto">
-          <a:xfrm>
-            <a:off x="575029" y="5862802"/>
-            <a:ext cx="7734052" cy="369332"/>
-          </a:xfrm>
-          <a:prstGeom prst="rect">
-            <a:avLst/>
-          </a:prstGeom>
-          <a:solidFill>
-            <a:srgbClr val="F5F5F5"/>
-          </a:solidFill>
-          <a:ln>
-            <a:noFill/>
-          </a:ln>
-          <a:effectLst/>
-          <a:extLst>
-            <a:ext uri="{91240B29-F687-4f45-9708-019B960494DF}">
-              <a14:hiddenLine xmlns:a14="http://schemas.microsoft.com/office/drawing/2010/main" xmlns="" w="9525">
-                <a:solidFill>
-                  <a:schemeClr val="tx1"/>
-                </a:solidFill>
-                <a:miter lim="800000"/>
-                <a:headEnd/>
-                <a:tailEnd/>
-              </a14:hiddenLine>
-            </a:ext>
-            <a:ext uri="{AF507438-7753-43e0-B8FC-AC1667EBCBE1}">
-              <a14:hiddenEffects xmlns:a14="http://schemas.microsoft.com/office/drawing/2010/main" xmlns="">
-                <a:effectLst>
-                  <a:outerShdw dist="35921" dir="2700000" algn="ctr" rotWithShape="0">
-                    <a:schemeClr val="bg2"/>
-                  </a:outerShdw>
-                </a:effectLst>
-              </a14:hiddenEffects>
-            </a:ext>
-          </a:extLst>
-        </p:spPr>
-        <p:txBody>
-          <a:bodyPr vert="horz" wrap="square" lIns="0" tIns="0" rIns="0" bIns="0" numCol="1" anchor="ctr" anchorCtr="0" compatLnSpc="1">
-            <a:prstTxWarp prst="textNoShape">
-              <a:avLst/>
-            </a:prstTxWarp>
-            <a:spAutoFit/>
-          </a:bodyPr>
-          <a:lstStyle>
-            <a:lvl1pPr eaLnBrk="0" fontAlgn="base" hangingPunct="0">
-              <a:spcBef>
-                <a:spcPct val="0"/>
-              </a:spcBef>
-              <a:spcAft>
-                <a:spcPct val="0"/>
-              </a:spcAft>
-              <a:defRPr>
-                <a:solidFill>
-                  <a:schemeClr val="tx1"/>
-                </a:solidFill>
-                <a:latin typeface="Arial" panose="020B0604020202020204" pitchFamily="34" charset="0"/>
-              </a:defRPr>
-            </a:lvl1pPr>
-            <a:lvl2pPr eaLnBrk="0" fontAlgn="base" hangingPunct="0">
-              <a:spcBef>
-                <a:spcPct val="0"/>
-              </a:spcBef>
-              <a:spcAft>
-                <a:spcPct val="0"/>
-              </a:spcAft>
-              <a:defRPr>
-                <a:solidFill>
-                  <a:schemeClr val="tx1"/>
-                </a:solidFill>
-                <a:latin typeface="Arial" panose="020B0604020202020204" pitchFamily="34" charset="0"/>
-              </a:defRPr>
-            </a:lvl2pPr>
-            <a:lvl3pPr eaLnBrk="0" fontAlgn="base" hangingPunct="0">
-              <a:spcBef>
-                <a:spcPct val="0"/>
-              </a:spcBef>
-              <a:spcAft>
-                <a:spcPct val="0"/>
-              </a:spcAft>
-              <a:defRPr>
-                <a:solidFill>
-                  <a:schemeClr val="tx1"/>
-                </a:solidFill>
-                <a:latin typeface="Arial" panose="020B0604020202020204" pitchFamily="34" charset="0"/>
-              </a:defRPr>
-            </a:lvl3pPr>
-            <a:lvl4pPr eaLnBrk="0" fontAlgn="base" hangingPunct="0">
-              <a:spcBef>
-                <a:spcPct val="0"/>
-              </a:spcBef>
-              <a:spcAft>
-                <a:spcPct val="0"/>
-              </a:spcAft>
-              <a:defRPr>
-                <a:solidFill>
-                  <a:schemeClr val="tx1"/>
-                </a:solidFill>
-                <a:latin typeface="Arial" panose="020B0604020202020204" pitchFamily="34" charset="0"/>
-              </a:defRPr>
-            </a:lvl4pPr>
-            <a:lvl5pPr eaLnBrk="0" fontAlgn="base" hangingPunct="0">
-              <a:spcBef>
-                <a:spcPct val="0"/>
-              </a:spcBef>
-              <a:spcAft>
-                <a:spcPct val="0"/>
-              </a:spcAft>
-              <a:defRPr>
-                <a:solidFill>
-                  <a:schemeClr val="tx1"/>
-                </a:solidFill>
-                <a:latin typeface="Arial" panose="020B0604020202020204" pitchFamily="34" charset="0"/>
-              </a:defRPr>
-            </a:lvl5pPr>
-            <a:lvl6pPr eaLnBrk="0" fontAlgn="base" hangingPunct="0">
-              <a:spcBef>
-                <a:spcPct val="0"/>
-              </a:spcBef>
-              <a:spcAft>
-                <a:spcPct val="0"/>
-              </a:spcAft>
-              <a:defRPr>
-                <a:solidFill>
-                  <a:schemeClr val="tx1"/>
-                </a:solidFill>
-                <a:latin typeface="Arial" panose="020B0604020202020204" pitchFamily="34" charset="0"/>
-              </a:defRPr>
-            </a:lvl6pPr>
-            <a:lvl7pPr eaLnBrk="0" fontAlgn="base" hangingPunct="0">
-              <a:spcBef>
-                <a:spcPct val="0"/>
-              </a:spcBef>
-              <a:spcAft>
-                <a:spcPct val="0"/>
-              </a:spcAft>
-              <a:defRPr>
-                <a:solidFill>
-                  <a:schemeClr val="tx1"/>
-                </a:solidFill>
-                <a:latin typeface="Arial" panose="020B0604020202020204" pitchFamily="34" charset="0"/>
-              </a:defRPr>
-            </a:lvl7pPr>
-            <a:lvl8pPr eaLnBrk="0" fontAlgn="base" hangingPunct="0">
-              <a:spcBef>
-                <a:spcPct val="0"/>
-              </a:spcBef>
-              <a:spcAft>
-                <a:spcPct val="0"/>
-              </a:spcAft>
-              <a:defRPr>
-                <a:solidFill>
-                  <a:schemeClr val="tx1"/>
-                </a:solidFill>
-                <a:latin typeface="Arial" panose="020B0604020202020204" pitchFamily="34" charset="0"/>
-              </a:defRPr>
-            </a:lvl8pPr>
-            <a:lvl9pPr eaLnBrk="0" fontAlgn="base" hangingPunct="0">
-              <a:spcBef>
-                <a:spcPct val="0"/>
-              </a:spcBef>
-              <a:spcAft>
-                <a:spcPct val="0"/>
-              </a:spcAft>
-              <a:defRPr>
-                <a:solidFill>
-                  <a:schemeClr val="tx1"/>
-                </a:solidFill>
-                <a:latin typeface="Arial" panose="020B0604020202020204" pitchFamily="34" charset="0"/>
-              </a:defRPr>
-            </a:lvl9pPr>
-          </a:lstStyle>
-          <a:p>
-            <a:pPr marL="0" marR="0" lvl="0" indent="0" algn="ctr" defTabSz="914400" rtl="0" eaLnBrk="0" fontAlgn="base" latinLnBrk="0" hangingPunct="0">
-              <a:lnSpc>
-                <a:spcPct val="100000"/>
-              </a:lnSpc>
-              <a:spcBef>
-                <a:spcPct val="0"/>
-              </a:spcBef>
-              <a:spcAft>
-                <a:spcPct val="0"/>
-              </a:spcAft>
-              <a:buClrTx/>
-              <a:buSzTx/>
-              <a:buFontTx/>
-              <a:buNone/>
-              <a:tabLst/>
-            </a:pPr>
-            <a:r>
-              <a:rPr kumimoji="0" lang="en-US" altLang="en-US" sz="1200" b="0" i="0" u="none" strike="noStrike" cap="none" normalizeH="0" baseline="0" dirty="0">
-                <a:ln>
-                  <a:noFill/>
-                </a:ln>
-                <a:solidFill>
-                  <a:srgbClr val="4374B7"/>
-                </a:solidFill>
-                <a:effectLst/>
-                <a:latin typeface="Helvetica Neue"/>
-              </a:rPr>
-              <a:t>                         </a:t>
-            </a:r>
-            <a:br>
-              <a:rPr kumimoji="0" lang="en-US" altLang="en-US" sz="1050" b="0" i="0" u="none" strike="noStrike" cap="none" normalizeH="0" baseline="0" dirty="0">
-                <a:ln>
-                  <a:noFill/>
-                </a:ln>
-                <a:solidFill>
-                  <a:schemeClr val="tx1"/>
-                </a:solidFill>
-                <a:effectLst/>
-              </a:rPr>
-            </a:br>
-            <a:r>
-              <a:rPr kumimoji="0" lang="en-US" altLang="en-US" sz="1200" b="0" i="0" u="none" strike="noStrike" cap="none" normalizeH="0" baseline="0" dirty="0">
-                <a:ln>
-                  <a:noFill/>
-                </a:ln>
-                <a:solidFill>
-                  <a:srgbClr val="000000"/>
-                </a:solidFill>
-                <a:effectLst/>
-                <a:latin typeface="Helvetica Neue"/>
-              </a:rPr>
-              <a:t>This work is licensed under a </a:t>
-            </a:r>
-            <a:r>
-              <a:rPr kumimoji="0" lang="en-US" altLang="en-US" sz="1200" b="0" i="0" u="none" strike="noStrike" cap="none" normalizeH="0" baseline="0" dirty="0">
-                <a:ln>
-                  <a:noFill/>
-                </a:ln>
-                <a:solidFill>
-                  <a:srgbClr val="4374B7"/>
-                </a:solidFill>
-                <a:effectLst/>
-                <a:latin typeface="Helvetica Neue"/>
-                <a:hlinkClick r:id="rId2"/>
-              </a:rPr>
-              <a:t>Creative Commons Attribution-</a:t>
-            </a:r>
-            <a:r>
-              <a:rPr kumimoji="0" lang="en-US" altLang="en-US" sz="1200" b="0" i="0" u="none" strike="noStrike" cap="none" normalizeH="0" baseline="0" dirty="0" err="1">
-                <a:ln>
-                  <a:noFill/>
-                </a:ln>
-                <a:solidFill>
-                  <a:srgbClr val="4374B7"/>
-                </a:solidFill>
-                <a:effectLst/>
-                <a:latin typeface="Helvetica Neue"/>
-                <a:hlinkClick r:id="rId2"/>
-              </a:rPr>
-              <a:t>NonCommercial</a:t>
-            </a:r>
-            <a:r>
-              <a:rPr kumimoji="0" lang="en-US" altLang="en-US" sz="1200" b="0" i="0" u="none" strike="noStrike" cap="none" normalizeH="0" baseline="0" dirty="0">
-                <a:ln>
-                  <a:noFill/>
-                </a:ln>
-                <a:solidFill>
-                  <a:srgbClr val="4374B7"/>
-                </a:solidFill>
-                <a:effectLst/>
-                <a:latin typeface="Helvetica Neue"/>
-                <a:hlinkClick r:id="rId2"/>
-              </a:rPr>
-              <a:t>-</a:t>
-            </a:r>
-            <a:r>
-              <a:rPr kumimoji="0" lang="en-US" altLang="en-US" sz="1200" b="0" i="0" u="none" strike="noStrike" cap="none" normalizeH="0" baseline="0" dirty="0" err="1">
-                <a:ln>
-                  <a:noFill/>
-                </a:ln>
-                <a:solidFill>
-                  <a:srgbClr val="4374B7"/>
-                </a:solidFill>
-                <a:effectLst/>
-                <a:latin typeface="Helvetica Neue"/>
-                <a:hlinkClick r:id="rId2"/>
-              </a:rPr>
-              <a:t>ShareAlike</a:t>
-            </a:r>
-            <a:r>
-              <a:rPr kumimoji="0" lang="en-US" altLang="en-US" sz="1200" b="0" i="0" u="none" strike="noStrike" cap="none" normalizeH="0" baseline="0" dirty="0">
-                <a:ln>
-                  <a:noFill/>
-                </a:ln>
-                <a:solidFill>
-                  <a:srgbClr val="4374B7"/>
-                </a:solidFill>
-                <a:effectLst/>
-                <a:latin typeface="Helvetica Neue"/>
-                <a:hlinkClick r:id="rId2"/>
-              </a:rPr>
-              <a:t> 4.0 International License</a:t>
-            </a:r>
-            <a:r>
-              <a:rPr kumimoji="0" lang="en-US" altLang="en-US" sz="1200" b="0" i="0" u="none" strike="noStrike" cap="none" normalizeH="0" baseline="0" dirty="0">
-                <a:ln>
-                  <a:noFill/>
-                </a:ln>
-                <a:solidFill>
-                  <a:srgbClr val="000000"/>
-                </a:solidFill>
-                <a:effectLst/>
-                <a:latin typeface="Helvetica Neue"/>
-              </a:rPr>
-              <a:t>.</a:t>
-            </a:r>
-            <a:r>
-              <a:rPr kumimoji="0" lang="en-US" altLang="en-US" sz="1050" b="0" i="0" u="none" strike="noStrike" cap="none" normalizeH="0" baseline="0" dirty="0">
-                <a:ln>
-                  <a:noFill/>
-                </a:ln>
-                <a:solidFill>
-                  <a:schemeClr val="tx1"/>
-                </a:solidFill>
-                <a:effectLst/>
-              </a:rPr>
-              <a:t> </a:t>
-            </a:r>
-            <a:endParaRPr kumimoji="0" lang="en-US" altLang="en-US" sz="1200" b="0" i="0" u="none" strike="noStrike" cap="none" normalizeH="0" baseline="0" dirty="0">
-              <a:ln>
-                <a:noFill/>
-              </a:ln>
-              <a:solidFill>
-                <a:srgbClr val="4374B7"/>
-              </a:solidFill>
-              <a:effectLst/>
-              <a:latin typeface="Helvetica Neue"/>
-            </a:endParaRPr>
-          </a:p>
-        </p:txBody>
-      </p:sp>
-      <p:pic>
-        <p:nvPicPr>
-          <p:cNvPr id="6" name="Picture 5" descr="Creative Commons License">
-            <a:hlinkClick r:id="rId2"/>
-          </p:cNvPr>
-          <p:cNvPicPr>
-            <a:picLocks noChangeAspect="1" noChangeArrowheads="1"/>
-          </p:cNvPicPr>
-          <p:nvPr/>
-        </p:nvPicPr>
-        <p:blipFill>
-          <a:blip r:embed="rId3">
-            <a:extLst>
-              <a:ext uri="{28A0092B-C50C-407E-A947-70E740481C1C}">
-                <a14:useLocalDpi xmlns:a14="http://schemas.microsoft.com/office/drawing/2010/main" val="0"/>
-              </a:ext>
-            </a:extLst>
-          </a:blip>
-          <a:srcRect/>
-          <a:stretch>
-            <a:fillRect/>
-          </a:stretch>
-        </p:blipFill>
-        <p:spPr bwMode="auto">
-          <a:xfrm>
-            <a:off x="3702510" y="5253616"/>
-            <a:ext cx="1479091" cy="521045"/>
-          </a:xfrm>
-          <a:prstGeom prst="rect">
-            <a:avLst/>
-          </a:prstGeom>
-          <a:noFill/>
-          <a:extLst>
-            <a:ext uri="{909E8E84-426E-40dd-AFC4-6F175D3DCCD1}">
-              <a14:hiddenFill xmlns:a14="http://schemas.microsoft.com/office/drawing/2010/main" xmlns="">
-                <a:solidFill>
-                  <a:srgbClr val="FFFFFF"/>
-                </a:solidFill>
-              </a14:hiddenFill>
-            </a:ext>
-          </a:extLst>
-        </p:spPr>
-      </p:pic>
-    </p:spTree>
-    <p:extLst>
-      <p:ext uri="{BB962C8B-B14F-4D97-AF65-F5344CB8AC3E}">
-        <p14:creationId xmlns:p14="http://schemas.microsoft.com/office/powerpoint/2010/main" val="3392129947"/>
       </p:ext>
     </p:extLst>
   </p:cSld>

</xml_diff>

<commit_message>
All Turning and Repeat Block updated and bug fix noted
</commit_message>
<xml_diff>
--- a/en/ProgrammingLessons/SP3AccurateTurning.pptx
+++ b/en/ProgrammingLessons/SP3AccurateTurning.pptx
@@ -7713,7 +7713,7 @@
           <a:effectLst/>
           <a:extLst>
             <a:ext uri="{91240B29-F687-4f45-9708-019B960494DF}">
-              <a14:hiddenLine xmlns:a14="http://schemas.microsoft.com/office/drawing/2010/main" xmlns="" w="9525">
+              <a14:hiddenLine xmlns="" xmlns:a14="http://schemas.microsoft.com/office/drawing/2010/main" w="9525">
                 <a:solidFill>
                   <a:schemeClr val="tx1"/>
                 </a:solidFill>
@@ -7723,7 +7723,7 @@
               </a14:hiddenLine>
             </a:ext>
             <a:ext uri="{AF507438-7753-43e0-B8FC-AC1667EBCBE1}">
-              <a14:hiddenEffects xmlns:a14="http://schemas.microsoft.com/office/drawing/2010/main" xmlns="">
+              <a14:hiddenEffects xmlns="" xmlns:a14="http://schemas.microsoft.com/office/drawing/2010/main">
                 <a:effectLst>
                   <a:outerShdw dist="35921" dir="2700000" algn="ctr" rotWithShape="0">
                     <a:schemeClr val="bg2"/>
@@ -8064,7 +8064,7 @@
           <a:noFill/>
           <a:extLst>
             <a:ext uri="{909E8E84-426E-40dd-AFC4-6F175D3DCCD1}">
-              <a14:hiddenFill xmlns:a14="http://schemas.microsoft.com/office/drawing/2010/main" xmlns="">
+              <a14:hiddenFill xmlns="" xmlns:a14="http://schemas.microsoft.com/office/drawing/2010/main">
                 <a:solidFill>
                   <a:srgbClr val="FFFFFF"/>
                 </a:solidFill>
@@ -8343,7 +8343,7 @@
             <a:pPr lvl="1"/>
             <a:r>
               <a:rPr lang="en-US" dirty="0"/>
-              <a:t>Wait until the yaw angle reads 0</a:t>
+              <a:t>Wait until the yaw angle reads close to 0</a:t>
             </a:r>
           </a:p>
           <a:p>
@@ -8465,10 +8465,10 @@
       </p:pic>
       <p:pic>
         <p:nvPicPr>
-          <p:cNvPr id="9" name="Picture 8">
+          <p:cNvPr id="6" name="Picture 5">
             <a:extLst>
               <a:ext uri="{FF2B5EF4-FFF2-40B4-BE49-F238E27FC236}">
-                <a16:creationId xmlns:a16="http://schemas.microsoft.com/office/drawing/2014/main" id="{D5BDF7AC-FB1F-7BB7-6240-537F362FC833}"/>
+                <a16:creationId xmlns:a16="http://schemas.microsoft.com/office/drawing/2014/main" id="{92180264-F5CA-842C-C7C0-C09AB9AB5609}"/>
               </a:ext>
             </a:extLst>
           </p:cNvPr>
@@ -8485,8 +8485,8 @@
         </p:blipFill>
         <p:spPr>
           <a:xfrm>
-            <a:off x="5743895" y="2401256"/>
-            <a:ext cx="3262945" cy="1124819"/>
+            <a:off x="5692669" y="2506418"/>
+            <a:ext cx="3365395" cy="954366"/>
           </a:xfrm>
           <a:prstGeom prst="rect">
             <a:avLst/>

</xml_diff>